<commit_message>
Final version - presentation6 - ethereum
</commit_message>
<xml_diff>
--- a/MondayPresentations/6_ethereum/Ethereum.pptx
+++ b/MondayPresentations/6_ethereum/Ethereum.pptx
@@ -8820,7 +8820,7 @@
         </p:spPr>
         <p:txBody>
           <a:bodyPr>
-            <a:normAutofit fontScale="92500" lnSpcReduction="10000"/>
+            <a:normAutofit fontScale="92500" lnSpcReduction="20000"/>
           </a:bodyPr>
           <a:lstStyle/>
           <a:p>
@@ -8986,6 +8986,19 @@
               <a:buNone/>
             </a:pPr>
             <a:r>
+              <a:rPr lang="en-US" dirty="0">
+                <a:solidFill>
+                  <a:schemeClr val="accent6"/>
+                </a:solidFill>
+              </a:rPr>
+              <a:t>        // 0.1 ETH = 100000000000000000</a:t>
+            </a:r>
+          </a:p>
+          <a:p>
+            <a:pPr marL="0" indent="0">
+              <a:buNone/>
+            </a:pPr>
+            <a:r>
               <a:rPr lang="en-US" dirty="0"/>
               <a:t>        require(_</a:t>
             </a:r>
@@ -9063,7 +9076,7 @@
                   <a:schemeClr val="accent6"/>
                 </a:solidFill>
               </a:rPr>
-              <a:t>    // Standard function used to fund the contract.</a:t>
+              <a:t>    // Default function used to fund the contract.</a:t>
             </a:r>
           </a:p>
           <a:p>

</xml_diff>